<commit_message>
Updated documentation, presentation proposal
</commit_message>
<xml_diff>
--- a/HDC-PAC Proposal - scRNAseq Workflows.pptx
+++ b/HDC-PAC Proposal - scRNAseq Workflows.pptx
@@ -576,7 +576,7 @@
               <a:pPr>
                 <a:defRPr/>
               </a:pPr>
-              <a:t>4/18/19</a:t>
+              <a:t>4/25/19</a:t>
             </a:fld>
             <a:endParaRPr lang="en-US" altLang="en-US"/>
           </a:p>
@@ -933,7 +933,7 @@
               </a14:hiddenFill>
             </a:ext>
             <a:ext uri="{FAA26D3D-D897-4be2-8F04-BA451C77F1D7}">
-              <ma14:placeholderFlag xmlns:ma14="http://schemas.microsoft.com/office/mac/drawingml/2011/main" xmlns="" val="1"/>
+              <ma14:placeholderFlag xmlns="" xmlns:ma14="http://schemas.microsoft.com/office/mac/drawingml/2011/main" val="1"/>
             </a:ext>
           </a:extLst>
         </p:spPr>
@@ -969,7 +969,7 @@
               </a14:hiddenLine>
             </a:ext>
             <a:ext uri="{FAA26D3D-D897-4be2-8F04-BA451C77F1D7}">
-              <ma14:placeholderFlag xmlns:ma14="http://schemas.microsoft.com/office/mac/drawingml/2011/main" xmlns="" val="1"/>
+              <ma14:placeholderFlag xmlns="" xmlns:ma14="http://schemas.microsoft.com/office/mac/drawingml/2011/main" val="1"/>
             </a:ext>
           </a:extLst>
         </p:spPr>
@@ -1167,6 +1167,285 @@
         </p:txBody>
       </p:sp>
     </p:spTree>
+  </p:cSld>
+  <p:clrMapOvr>
+    <a:masterClrMapping/>
+  </p:clrMapOvr>
+</p:notes>
+</file>
+
+<file path=ppt/notesSlides/notesSlide2.xml><?xml version="1.0" encoding="utf-8"?>
+<p:notes xmlns:a="http://schemas.openxmlformats.org/drawingml/2006/main" xmlns:r="http://schemas.openxmlformats.org/officeDocument/2006/relationships" xmlns:p="http://schemas.openxmlformats.org/presentationml/2006/main">
+  <p:cSld>
+    <p:spTree>
+      <p:nvGrpSpPr>
+        <p:cNvPr id="1" name=""/>
+        <p:cNvGrpSpPr/>
+        <p:nvPr/>
+      </p:nvGrpSpPr>
+      <p:grpSpPr>
+        <a:xfrm>
+          <a:off x="0" y="0"/>
+          <a:ext cx="0" cy="0"/>
+          <a:chOff x="0" y="0"/>
+          <a:chExt cx="0" cy="0"/>
+        </a:xfrm>
+      </p:grpSpPr>
+      <p:sp>
+        <p:nvSpPr>
+          <p:cNvPr id="2" name="Slide Image Placeholder 1"/>
+          <p:cNvSpPr>
+            <a:spLocks noGrp="1" noRot="1" noChangeAspect="1"/>
+          </p:cNvSpPr>
+          <p:nvPr>
+            <p:ph type="sldImg"/>
+          </p:nvPr>
+        </p:nvSpPr>
+        <p:spPr/>
+      </p:sp>
+      <p:sp>
+        <p:nvSpPr>
+          <p:cNvPr id="3" name="Notes Placeholder 2"/>
+          <p:cNvSpPr>
+            <a:spLocks noGrp="1"/>
+          </p:cNvSpPr>
+          <p:nvPr>
+            <p:ph type="body" idx="1"/>
+          </p:nvPr>
+        </p:nvSpPr>
+        <p:spPr/>
+        <p:txBody>
+          <a:bodyPr/>
+          <a:lstStyle/>
+          <a:p>
+            <a:r>
+              <a:rPr lang="en-US" dirty="0"/>
+              <a:t> </a:t>
+            </a:r>
+          </a:p>
+        </p:txBody>
+      </p:sp>
+      <p:sp>
+        <p:nvSpPr>
+          <p:cNvPr id="4" name="Slide Number Placeholder 3"/>
+          <p:cNvSpPr>
+            <a:spLocks noGrp="1"/>
+          </p:cNvSpPr>
+          <p:nvPr>
+            <p:ph type="sldNum" sz="quarter" idx="5"/>
+          </p:nvPr>
+        </p:nvSpPr>
+        <p:spPr/>
+        <p:txBody>
+          <a:bodyPr/>
+          <a:lstStyle/>
+          <a:p>
+            <a:pPr>
+              <a:defRPr/>
+            </a:pPr>
+            <a:fld id="{C2E17A2B-7027-D045-B9B0-B9A98C3ADF9E}" type="slidenum">
+              <a:rPr lang="en-US" altLang="en-US" smtClean="0"/>
+              <a:pPr>
+                <a:defRPr/>
+              </a:pPr>
+              <a:t>3</a:t>
+            </a:fld>
+            <a:endParaRPr lang="en-US" altLang="en-US"/>
+          </a:p>
+        </p:txBody>
+      </p:sp>
+    </p:spTree>
+    <p:extLst>
+      <p:ext uri="{BB962C8B-B14F-4D97-AF65-F5344CB8AC3E}">
+        <p14:creationId xmlns:p14="http://schemas.microsoft.com/office/powerpoint/2010/main" val="310989585"/>
+      </p:ext>
+    </p:extLst>
+  </p:cSld>
+  <p:clrMapOvr>
+    <a:masterClrMapping/>
+  </p:clrMapOvr>
+</p:notes>
+</file>
+
+<file path=ppt/notesSlides/notesSlide3.xml><?xml version="1.0" encoding="utf-8"?>
+<p:notes xmlns:a="http://schemas.openxmlformats.org/drawingml/2006/main" xmlns:r="http://schemas.openxmlformats.org/officeDocument/2006/relationships" xmlns:p="http://schemas.openxmlformats.org/presentationml/2006/main">
+  <p:cSld>
+    <p:spTree>
+      <p:nvGrpSpPr>
+        <p:cNvPr id="1" name=""/>
+        <p:cNvGrpSpPr/>
+        <p:nvPr/>
+      </p:nvGrpSpPr>
+      <p:grpSpPr>
+        <a:xfrm>
+          <a:off x="0" y="0"/>
+          <a:ext cx="0" cy="0"/>
+          <a:chOff x="0" y="0"/>
+          <a:chExt cx="0" cy="0"/>
+        </a:xfrm>
+      </p:grpSpPr>
+      <p:sp>
+        <p:nvSpPr>
+          <p:cNvPr id="2" name="Slide Image Placeholder 1"/>
+          <p:cNvSpPr>
+            <a:spLocks noGrp="1" noRot="1" noChangeAspect="1"/>
+          </p:cNvSpPr>
+          <p:nvPr>
+            <p:ph type="sldImg"/>
+          </p:nvPr>
+        </p:nvSpPr>
+        <p:spPr/>
+      </p:sp>
+      <p:sp>
+        <p:nvSpPr>
+          <p:cNvPr id="3" name="Notes Placeholder 2"/>
+          <p:cNvSpPr>
+            <a:spLocks noGrp="1"/>
+          </p:cNvSpPr>
+          <p:nvPr>
+            <p:ph type="body" idx="1"/>
+          </p:nvPr>
+        </p:nvSpPr>
+        <p:spPr/>
+        <p:txBody>
+          <a:bodyPr/>
+          <a:lstStyle/>
+          <a:p>
+            <a:r>
+              <a:rPr lang="en-US" dirty="0"/>
+              <a:t>Metrics - time saved. Time to return. Set a baseline. </a:t>
+            </a:r>
+          </a:p>
+        </p:txBody>
+      </p:sp>
+      <p:sp>
+        <p:nvSpPr>
+          <p:cNvPr id="4" name="Slide Number Placeholder 3"/>
+          <p:cNvSpPr>
+            <a:spLocks noGrp="1"/>
+          </p:cNvSpPr>
+          <p:nvPr>
+            <p:ph type="sldNum" sz="quarter" idx="5"/>
+          </p:nvPr>
+        </p:nvSpPr>
+        <p:spPr/>
+        <p:txBody>
+          <a:bodyPr/>
+          <a:lstStyle/>
+          <a:p>
+            <a:pPr>
+              <a:defRPr/>
+            </a:pPr>
+            <a:fld id="{C2E17A2B-7027-D045-B9B0-B9A98C3ADF9E}" type="slidenum">
+              <a:rPr lang="en-US" altLang="en-US" smtClean="0"/>
+              <a:pPr>
+                <a:defRPr/>
+              </a:pPr>
+              <a:t>6</a:t>
+            </a:fld>
+            <a:endParaRPr lang="en-US" altLang="en-US"/>
+          </a:p>
+        </p:txBody>
+      </p:sp>
+    </p:spTree>
+    <p:extLst>
+      <p:ext uri="{BB962C8B-B14F-4D97-AF65-F5344CB8AC3E}">
+        <p14:creationId xmlns:p14="http://schemas.microsoft.com/office/powerpoint/2010/main" val="1571173730"/>
+      </p:ext>
+    </p:extLst>
+  </p:cSld>
+  <p:clrMapOvr>
+    <a:masterClrMapping/>
+  </p:clrMapOvr>
+</p:notes>
+</file>
+
+<file path=ppt/notesSlides/notesSlide4.xml><?xml version="1.0" encoding="utf-8"?>
+<p:notes xmlns:a="http://schemas.openxmlformats.org/drawingml/2006/main" xmlns:r="http://schemas.openxmlformats.org/officeDocument/2006/relationships" xmlns:p="http://schemas.openxmlformats.org/presentationml/2006/main">
+  <p:cSld>
+    <p:spTree>
+      <p:nvGrpSpPr>
+        <p:cNvPr id="1" name=""/>
+        <p:cNvGrpSpPr/>
+        <p:nvPr/>
+      </p:nvGrpSpPr>
+      <p:grpSpPr>
+        <a:xfrm>
+          <a:off x="0" y="0"/>
+          <a:ext cx="0" cy="0"/>
+          <a:chOff x="0" y="0"/>
+          <a:chExt cx="0" cy="0"/>
+        </a:xfrm>
+      </p:grpSpPr>
+      <p:sp>
+        <p:nvSpPr>
+          <p:cNvPr id="2" name="Slide Image Placeholder 1"/>
+          <p:cNvSpPr>
+            <a:spLocks noGrp="1" noRot="1" noChangeAspect="1"/>
+          </p:cNvSpPr>
+          <p:nvPr>
+            <p:ph type="sldImg"/>
+          </p:nvPr>
+        </p:nvSpPr>
+        <p:spPr/>
+      </p:sp>
+      <p:sp>
+        <p:nvSpPr>
+          <p:cNvPr id="3" name="Notes Placeholder 2"/>
+          <p:cNvSpPr>
+            <a:spLocks noGrp="1"/>
+          </p:cNvSpPr>
+          <p:nvPr>
+            <p:ph type="body" idx="1"/>
+          </p:nvPr>
+        </p:nvSpPr>
+        <p:spPr/>
+        <p:txBody>
+          <a:bodyPr/>
+          <a:lstStyle/>
+          <a:p>
+            <a:r>
+              <a:rPr lang="en-US" dirty="0"/>
+              <a:t>Adopt best practices. Scratch file system. </a:t>
+            </a:r>
+          </a:p>
+        </p:txBody>
+      </p:sp>
+      <p:sp>
+        <p:nvSpPr>
+          <p:cNvPr id="4" name="Slide Number Placeholder 3"/>
+          <p:cNvSpPr>
+            <a:spLocks noGrp="1"/>
+          </p:cNvSpPr>
+          <p:nvPr>
+            <p:ph type="sldNum" sz="quarter" idx="5"/>
+          </p:nvPr>
+        </p:nvSpPr>
+        <p:spPr/>
+        <p:txBody>
+          <a:bodyPr/>
+          <a:lstStyle/>
+          <a:p>
+            <a:pPr>
+              <a:defRPr/>
+            </a:pPr>
+            <a:fld id="{C2E17A2B-7027-D045-B9B0-B9A98C3ADF9E}" type="slidenum">
+              <a:rPr lang="en-US" altLang="en-US" smtClean="0"/>
+              <a:pPr>
+                <a:defRPr/>
+              </a:pPr>
+              <a:t>7</a:t>
+            </a:fld>
+            <a:endParaRPr lang="en-US" altLang="en-US"/>
+          </a:p>
+        </p:txBody>
+      </p:sp>
+    </p:spTree>
+    <p:extLst>
+      <p:ext uri="{BB962C8B-B14F-4D97-AF65-F5344CB8AC3E}">
+        <p14:creationId xmlns:p14="http://schemas.microsoft.com/office/powerpoint/2010/main" val="406663200"/>
+      </p:ext>
+    </p:extLst>
   </p:cSld>
   <p:clrMapOvr>
     <a:masterClrMapping/>
@@ -4058,7 +4337,7 @@
               </a14:hiddenLine>
             </a:ext>
             <a:ext uri="{FAA26D3D-D897-4be2-8F04-BA451C77F1D7}">
-              <ma14:placeholderFlag xmlns:ma14="http://schemas.microsoft.com/office/mac/drawingml/2011/main" xmlns="" val="1"/>
+              <ma14:placeholderFlag xmlns="" xmlns:ma14="http://schemas.microsoft.com/office/mac/drawingml/2011/main" val="1"/>
             </a:ext>
           </a:extLst>
         </p:spPr>
@@ -4119,7 +4398,7 @@
               </a14:hiddenLine>
             </a:ext>
             <a:ext uri="{FAA26D3D-D897-4be2-8F04-BA451C77F1D7}">
-              <ma14:placeholderFlag xmlns:ma14="http://schemas.microsoft.com/office/mac/drawingml/2011/main" xmlns="" val="1"/>
+              <ma14:placeholderFlag xmlns="" xmlns:ma14="http://schemas.microsoft.com/office/mac/drawingml/2011/main" val="1"/>
             </a:ext>
           </a:extLst>
         </p:spPr>
@@ -4780,7 +5059,7 @@
               </a14:hiddenLine>
             </a:ext>
             <a:ext uri="{FAA26D3D-D897-4be2-8F04-BA451C77F1D7}">
-              <ma14:placeholderFlag xmlns:ma14="http://schemas.microsoft.com/office/mac/drawingml/2011/main" xmlns="" val="1"/>
+              <ma14:placeholderFlag xmlns="" xmlns:ma14="http://schemas.microsoft.com/office/mac/drawingml/2011/main" val="1"/>
             </a:ext>
           </a:extLst>
         </p:spPr>
@@ -4841,7 +5120,7 @@
               </a14:hiddenLine>
             </a:ext>
             <a:ext uri="{FAA26D3D-D897-4be2-8F04-BA451C77F1D7}">
-              <ma14:placeholderFlag xmlns:ma14="http://schemas.microsoft.com/office/mac/drawingml/2011/main" xmlns="" val="1"/>
+              <ma14:placeholderFlag xmlns="" xmlns:ma14="http://schemas.microsoft.com/office/mac/drawingml/2011/main" val="1"/>
             </a:ext>
           </a:extLst>
         </p:spPr>
@@ -5533,7 +5812,7 @@
               </a14:hiddenLine>
             </a:ext>
             <a:ext uri="{FAA26D3D-D897-4be2-8F04-BA451C77F1D7}">
-              <ma14:placeholderFlag xmlns:ma14="http://schemas.microsoft.com/office/mac/drawingml/2011/main" xmlns="" val="1"/>
+              <ma14:placeholderFlag xmlns="" xmlns:ma14="http://schemas.microsoft.com/office/mac/drawingml/2011/main" val="1"/>
             </a:ext>
           </a:extLst>
         </p:spPr>
@@ -5594,7 +5873,7 @@
               </a14:hiddenLine>
             </a:ext>
             <a:ext uri="{FAA26D3D-D897-4be2-8F04-BA451C77F1D7}">
-              <ma14:placeholderFlag xmlns:ma14="http://schemas.microsoft.com/office/mac/drawingml/2011/main" xmlns="" val="1"/>
+              <ma14:placeholderFlag xmlns="" xmlns:ma14="http://schemas.microsoft.com/office/mac/drawingml/2011/main" val="1"/>
             </a:ext>
           </a:extLst>
         </p:spPr>
@@ -6362,7 +6641,7 @@
               </a14:hiddenLine>
             </a:ext>
             <a:ext uri="{FAA26D3D-D897-4be2-8F04-BA451C77F1D7}">
-              <ma14:placeholderFlag xmlns:ma14="http://schemas.microsoft.com/office/mac/drawingml/2011/main" xmlns="" val="1"/>
+              <ma14:placeholderFlag xmlns="" xmlns:ma14="http://schemas.microsoft.com/office/mac/drawingml/2011/main" val="1"/>
             </a:ext>
           </a:extLst>
         </p:spPr>
@@ -9285,7 +9564,7 @@
               </a14:hiddenLine>
             </a:ext>
             <a:ext uri="{FAA26D3D-D897-4be2-8F04-BA451C77F1D7}">
-              <ma14:placeholderFlag xmlns:ma14="http://schemas.microsoft.com/office/mac/drawingml/2011/main" xmlns="" val="1"/>
+              <ma14:placeholderFlag xmlns="" xmlns:ma14="http://schemas.microsoft.com/office/mac/drawingml/2011/main" val="1"/>
             </a:ext>
           </a:extLst>
         </p:spPr>
@@ -9700,7 +9979,7 @@
           <p:nvPr/>
         </p:nvPicPr>
         <p:blipFill rotWithShape="1">
-          <a:blip r:embed="rId2">
+          <a:blip r:embed="rId3">
             <a:extLst>
               <a:ext uri="{28A0092B-C50C-407E-A947-70E740481C1C}">
                 <a14:useLocalDpi xmlns:a14="http://schemas.microsoft.com/office/drawing/2010/main" val="0"/>
@@ -10769,7 +11048,7 @@
         <a:effectLst/>
         <a:extLst>
           <a:ext uri="{AF507438-7753-43e0-B8FC-AC1667EBCBE1}">
-            <a14:hiddenEffects xmlns:a14="http://schemas.microsoft.com/office/drawing/2010/main" xmlns="">
+            <a14:hiddenEffects xmlns="" xmlns:a14="http://schemas.microsoft.com/office/drawing/2010/main">
               <a:effectLst>
                 <a:outerShdw dist="35921" dir="2700000" algn="ctr" rotWithShape="0">
                   <a:schemeClr val="bg2"/>
@@ -11200,7 +11479,7 @@
         <a:effectLst/>
         <a:extLst>
           <a:ext uri="{AF507438-7753-43e0-B8FC-AC1667EBCBE1}">
-            <a14:hiddenEffects xmlns:a14="http://schemas.microsoft.com/office/drawing/2010/main" xmlns="">
+            <a14:hiddenEffects xmlns="" xmlns:a14="http://schemas.microsoft.com/office/drawing/2010/main">
               <a:effectLst>
                 <a:outerShdw dist="35921" dir="2700000" algn="ctr" rotWithShape="0">
                   <a:schemeClr val="bg2"/>
@@ -11631,7 +11910,7 @@
         <a:effectLst/>
         <a:extLst>
           <a:ext uri="{AF507438-7753-43e0-B8FC-AC1667EBCBE1}">
-            <a14:hiddenEffects xmlns:a14="http://schemas.microsoft.com/office/drawing/2010/main" xmlns="">
+            <a14:hiddenEffects xmlns="" xmlns:a14="http://schemas.microsoft.com/office/drawing/2010/main">
               <a:effectLst>
                 <a:outerShdw dist="35921" dir="2700000" algn="ctr" rotWithShape="0">
                   <a:schemeClr val="bg2"/>
@@ -12062,7 +12341,7 @@
         <a:effectLst/>
         <a:extLst>
           <a:ext uri="{AF507438-7753-43e0-B8FC-AC1667EBCBE1}">
-            <a14:hiddenEffects xmlns:a14="http://schemas.microsoft.com/office/drawing/2010/main" xmlns="">
+            <a14:hiddenEffects xmlns="" xmlns:a14="http://schemas.microsoft.com/office/drawing/2010/main">
               <a:effectLst>
                 <a:outerShdw dist="35921" dir="2700000" algn="ctr" rotWithShape="0">
                   <a:schemeClr val="bg2"/>
@@ -12800,15 +13079,6 @@
 </file>
 
 <file path=customXml/item1.xml><?xml version="1.0" encoding="utf-8"?>
-<?mso-contentType ?>
-<FormTemplates xmlns="http://schemas.microsoft.com/sharepoint/v3/contenttype/forms">
-  <Display>DocumentLibraryForm</Display>
-  <Edit>DocumentLibraryForm</Edit>
-  <New>DocumentLibraryForm</New>
-</FormTemplates>
-</file>
-
-<file path=customXml/item2.xml><?xml version="1.0" encoding="utf-8"?>
 <ct:contentTypeSchema xmlns:ct="http://schemas.microsoft.com/office/2006/metadata/contentType" xmlns:ma="http://schemas.microsoft.com/office/2006/metadata/properties/metaAttributes" ct:_="" ma:_="" ma:contentTypeName="Document" ma:contentTypeID="0x01010031F384A7689F2A4D9D9E923D44005757" ma:contentTypeVersion="0" ma:contentTypeDescription="Create a new document." ma:contentTypeScope="" ma:versionID="1ea9787e5e843aac544ddb872ae2fd67">
   <xsd:schema xmlns:xsd="http://www.w3.org/2001/XMLSchema" xmlns:xs="http://www.w3.org/2001/XMLSchema" xmlns:p="http://schemas.microsoft.com/office/2006/metadata/properties" targetNamespace="http://schemas.microsoft.com/office/2006/metadata/properties" ma:root="true" ma:fieldsID="1b05d82d297216baf5b26c55225140df">
     <xsd:element name="properties">
@@ -12922,15 +13192,16 @@
 </ct:contentTypeSchema>
 </file>
 
-<file path=customXml/itemProps1.xml><?xml version="1.0" encoding="utf-8"?>
-<ds:datastoreItem xmlns:ds="http://schemas.openxmlformats.org/officeDocument/2006/customXml" ds:itemID="{55598EF1-566B-4801-9022-DA461EE53909}">
-  <ds:schemaRefs>
-    <ds:schemaRef ds:uri="http://schemas.microsoft.com/sharepoint/v3/contenttype/forms"/>
-  </ds:schemaRefs>
-</ds:datastoreItem>
+<file path=customXml/item2.xml><?xml version="1.0" encoding="utf-8"?>
+<?mso-contentType ?>
+<FormTemplates xmlns="http://schemas.microsoft.com/sharepoint/v3/contenttype/forms">
+  <Display>DocumentLibraryForm</Display>
+  <Edit>DocumentLibraryForm</Edit>
+  <New>DocumentLibraryForm</New>
+</FormTemplates>
 </file>
 
-<file path=customXml/itemProps2.xml><?xml version="1.0" encoding="utf-8"?>
+<file path=customXml/itemProps1.xml><?xml version="1.0" encoding="utf-8"?>
 <ds:datastoreItem xmlns:ds="http://schemas.openxmlformats.org/officeDocument/2006/customXml" ds:itemID="{D3581A51-629C-468B-84BE-572F165BDA1F}">
   <ds:schemaRefs>
     <ds:schemaRef ds:uri="http://schemas.microsoft.com/office/2006/metadata/contentType"/>
@@ -12944,4 +13215,12 @@
     <ds:schemaRef ds:uri="http://schemas.microsoft.com/office/infopath/2007/PartnerControls"/>
   </ds:schemaRefs>
 </ds:datastoreItem>
+</file>
+
+<file path=customXml/itemProps2.xml><?xml version="1.0" encoding="utf-8"?>
+<ds:datastoreItem xmlns:ds="http://schemas.openxmlformats.org/officeDocument/2006/customXml" ds:itemID="{55598EF1-566B-4801-9022-DA461EE53909}">
+  <ds:schemaRefs>
+    <ds:schemaRef ds:uri="http://schemas.microsoft.com/sharepoint/v3/contenttype/forms"/>
+  </ds:schemaRefs>
+</ds:datastoreItem>
 </file>
</xml_diff>